<commit_message>
Ch3 fig cleanup (#103)
* figure polishing for ch3

* more ch3 figures
</commit_message>
<xml_diff>
--- a/source/img/code-figures.pptx
+++ b/source/img/code-figures.pptx
@@ -10,6 +10,8 @@
     <p:sldId id="258" r:id="rId4"/>
     <p:sldId id="259" r:id="rId5"/>
     <p:sldId id="260" r:id="rId6"/>
+    <p:sldId id="261" r:id="rId7"/>
+    <p:sldId id="262" r:id="rId8"/>
   </p:sldIdLst>
   <p:sldSz cx="12192000" cy="6858000"/>
   <p:notesSz cx="6858000" cy="9144000"/>
@@ -3414,17 +3416,26 @@
             </a:r>
             <a:r>
               <a:rPr lang="en-CA" sz="1400" dirty="0" err="1">
-                <a:latin typeface="Helvetica Neue Light" panose="02000403000000020004" pitchFamily="2" charset="0"/>
+                <a:latin typeface="Courier New" panose="02070309020205020404" pitchFamily="49" charset="0"/>
                 <a:ea typeface="Helvetica Neue Light" panose="02000403000000020004" pitchFamily="2" charset="0"/>
+                <a:cs typeface="Courier New" panose="02070309020205020404" pitchFamily="49" charset="0"/>
               </a:rPr>
               <a:t>read_csv</a:t>
+            </a:r>
+            <a:r>
+              <a:rPr lang="en-CA" sz="1400" dirty="0">
+                <a:latin typeface="Courier New" panose="02070309020205020404" pitchFamily="49" charset="0"/>
+                <a:ea typeface="Helvetica Neue Light" panose="02000403000000020004" pitchFamily="2" charset="0"/>
+                <a:cs typeface="Courier New" panose="02070309020205020404" pitchFamily="49" charset="0"/>
+              </a:rPr>
+              <a:t> </a:t>
             </a:r>
             <a:r>
               <a:rPr lang="en-CA" sz="1400" dirty="0">
                 <a:latin typeface="Helvetica Neue Light" panose="02000403000000020004" pitchFamily="2" charset="0"/>
                 <a:ea typeface="Helvetica Neue Light" panose="02000403000000020004" pitchFamily="2" charset="0"/>
               </a:rPr>
-              <a:t> function</a:t>
+              <a:t>function</a:t>
             </a:r>
           </a:p>
         </p:txBody>
@@ -4815,8 +4826,8 @@
         </p:nvSpPr>
         <p:spPr>
           <a:xfrm>
-            <a:off x="5447818" y="2218798"/>
-            <a:ext cx="1296364" cy="523220"/>
+            <a:off x="5415322" y="2230627"/>
+            <a:ext cx="1361355" cy="523220"/>
           </a:xfrm>
           <a:prstGeom prst="rect">
             <a:avLst/>
@@ -4839,14 +4850,16 @@
             </a:r>
             <a:r>
               <a:rPr lang="en-CA" sz="1400" dirty="0" err="1">
-                <a:latin typeface="Helvetica Neue Light" panose="02000403000000020004" pitchFamily="2" charset="0"/>
+                <a:latin typeface="Courier New" panose="02070309020205020404" pitchFamily="49" charset="0"/>
                 <a:ea typeface="Helvetica Neue Light" panose="02000403000000020004" pitchFamily="2" charset="0"/>
+                <a:cs typeface="Courier New" panose="02070309020205020404" pitchFamily="49" charset="0"/>
               </a:rPr>
               <a:t>sort_values</a:t>
             </a:r>
             <a:endParaRPr lang="en-CA" sz="1400" dirty="0">
-              <a:latin typeface="Helvetica Neue Light" panose="02000403000000020004" pitchFamily="2" charset="0"/>
+              <a:latin typeface="Courier New" panose="02070309020205020404" pitchFamily="49" charset="0"/>
               <a:ea typeface="Helvetica Neue Light" panose="02000403000000020004" pitchFamily="2" charset="0"/>
+              <a:cs typeface="Courier New" panose="02070309020205020404" pitchFamily="49" charset="0"/>
             </a:endParaRPr>
           </a:p>
         </p:txBody>
@@ -4869,8 +4882,8 @@
         </p:nvCxnSpPr>
         <p:spPr>
           <a:xfrm>
-            <a:off x="6096000" y="2742018"/>
-            <a:ext cx="0" cy="404701"/>
+            <a:off x="6096000" y="2753847"/>
+            <a:ext cx="0" cy="392872"/>
           </a:xfrm>
           <a:prstGeom prst="straightConnector1">
             <a:avLst/>
@@ -5076,6 +5089,866 @@
     <p:extLst>
       <p:ext uri="{BB962C8B-B14F-4D97-AF65-F5344CB8AC3E}">
         <p14:creationId xmlns:p14="http://schemas.microsoft.com/office/powerpoint/2010/main" val="3454806930"/>
+      </p:ext>
+    </p:extLst>
+  </p:cSld>
+  <p:clrMapOvr>
+    <a:masterClrMapping/>
+  </p:clrMapOvr>
+</p:sld>
+</file>
+
+<file path=ppt/slides/slide6.xml><?xml version="1.0" encoding="utf-8"?>
+<p:sld xmlns:a="http://schemas.openxmlformats.org/drawingml/2006/main" xmlns:r="http://schemas.openxmlformats.org/officeDocument/2006/relationships" xmlns:p="http://schemas.openxmlformats.org/presentationml/2006/main">
+  <p:cSld>
+    <p:spTree>
+      <p:nvGrpSpPr>
+        <p:cNvPr id="1" name=""/>
+        <p:cNvGrpSpPr/>
+        <p:nvPr/>
+      </p:nvGrpSpPr>
+      <p:grpSpPr>
+        <a:xfrm>
+          <a:off x="0" y="0"/>
+          <a:ext cx="0" cy="0"/>
+          <a:chOff x="0" y="0"/>
+          <a:chExt cx="0" cy="0"/>
+        </a:xfrm>
+      </p:grpSpPr>
+      <p:pic>
+        <p:nvPicPr>
+          <p:cNvPr id="4" name="Picture 3">
+            <a:extLst>
+              <a:ext uri="{FF2B5EF4-FFF2-40B4-BE49-F238E27FC236}">
+                <a16:creationId xmlns:a16="http://schemas.microsoft.com/office/drawing/2014/main" id="{9ED44EA1-2D79-84A0-394B-B5C2F7A14DDD}"/>
+              </a:ext>
+            </a:extLst>
+          </p:cNvPr>
+          <p:cNvPicPr>
+            <a:picLocks noChangeAspect="1"/>
+          </p:cNvPicPr>
+          <p:nvPr/>
+        </p:nvPicPr>
+        <p:blipFill>
+          <a:blip r:embed="rId2"/>
+          <a:stretch>
+            <a:fillRect/>
+          </a:stretch>
+        </p:blipFill>
+        <p:spPr>
+          <a:xfrm>
+            <a:off x="2209800" y="3057451"/>
+            <a:ext cx="7772400" cy="743097"/>
+          </a:xfrm>
+          <a:prstGeom prst="rect">
+            <a:avLst/>
+          </a:prstGeom>
+        </p:spPr>
+      </p:pic>
+      <p:sp>
+        <p:nvSpPr>
+          <p:cNvPr id="5" name="TextBox 4">
+            <a:extLst>
+              <a:ext uri="{FF2B5EF4-FFF2-40B4-BE49-F238E27FC236}">
+                <a16:creationId xmlns:a16="http://schemas.microsoft.com/office/drawing/2014/main" id="{58B3C4B0-00B8-30A2-80B0-3E7CA6E199EB}"/>
+              </a:ext>
+            </a:extLst>
+          </p:cNvPr>
+          <p:cNvSpPr txBox="1"/>
+          <p:nvPr/>
+        </p:nvSpPr>
+        <p:spPr>
+          <a:xfrm>
+            <a:off x="1987858" y="3929804"/>
+            <a:ext cx="1296364" cy="738664"/>
+          </a:xfrm>
+          <a:prstGeom prst="rect">
+            <a:avLst/>
+          </a:prstGeom>
+          <a:noFill/>
+        </p:spPr>
+        <p:txBody>
+          <a:bodyPr wrap="square" rtlCol="0">
+            <a:spAutoFit/>
+          </a:bodyPr>
+          <a:lstStyle/>
+          <a:p>
+            <a:pPr algn="ctr"/>
+            <a:r>
+              <a:rPr lang="en-CA" sz="1400" dirty="0">
+                <a:latin typeface="Helvetica Neue Light" panose="02000403000000020004" pitchFamily="2" charset="0"/>
+                <a:ea typeface="Helvetica Neue Light" panose="02000403000000020004" pitchFamily="2" charset="0"/>
+              </a:rPr>
+              <a:t>1. create an </a:t>
+            </a:r>
+            <a:r>
+              <a:rPr lang="en-CA" sz="1400" dirty="0" err="1">
+                <a:latin typeface="Helvetica Neue Light" panose="02000403000000020004" pitchFamily="2" charset="0"/>
+                <a:ea typeface="Helvetica Neue Light" panose="02000403000000020004" pitchFamily="2" charset="0"/>
+              </a:rPr>
+              <a:t>altair</a:t>
+            </a:r>
+            <a:r>
+              <a:rPr lang="en-CA" sz="1400" dirty="0">
+                <a:latin typeface="Helvetica Neue Light" panose="02000403000000020004" pitchFamily="2" charset="0"/>
+                <a:ea typeface="Helvetica Neue Light" panose="02000403000000020004" pitchFamily="2" charset="0"/>
+              </a:rPr>
+              <a:t> </a:t>
+            </a:r>
+            <a:r>
+              <a:rPr lang="en-CA" sz="1400" dirty="0">
+                <a:latin typeface="Courier New" panose="02070309020205020404" pitchFamily="49" charset="0"/>
+                <a:ea typeface="Helvetica Neue Light" panose="02000403000000020004" pitchFamily="2" charset="0"/>
+                <a:cs typeface="Courier New" panose="02070309020205020404" pitchFamily="49" charset="0"/>
+              </a:rPr>
+              <a:t>Chart </a:t>
+            </a:r>
+            <a:r>
+              <a:rPr lang="en-CA" sz="1400" dirty="0">
+                <a:latin typeface="Helvetica Neue Light" panose="02000403000000020004" pitchFamily="2" charset="0"/>
+                <a:ea typeface="Helvetica Neue Light" panose="02000403000000020004" pitchFamily="2" charset="0"/>
+              </a:rPr>
+              <a:t>object</a:t>
+            </a:r>
+          </a:p>
+        </p:txBody>
+      </p:sp>
+      <p:cxnSp>
+        <p:nvCxnSpPr>
+          <p:cNvPr id="6" name="Straight Arrow Connector 5">
+            <a:extLst>
+              <a:ext uri="{FF2B5EF4-FFF2-40B4-BE49-F238E27FC236}">
+                <a16:creationId xmlns:a16="http://schemas.microsoft.com/office/drawing/2014/main" id="{076FE9B8-8349-9355-E949-4A12BDE0512E}"/>
+              </a:ext>
+            </a:extLst>
+          </p:cNvPr>
+          <p:cNvCxnSpPr>
+            <a:cxnSpLocks/>
+          </p:cNvCxnSpPr>
+          <p:nvPr/>
+        </p:nvCxnSpPr>
+        <p:spPr>
+          <a:xfrm flipV="1">
+            <a:off x="2733379" y="3569983"/>
+            <a:ext cx="320539" cy="354594"/>
+          </a:xfrm>
+          <a:prstGeom prst="straightConnector1">
+            <a:avLst/>
+          </a:prstGeom>
+          <a:ln w="31750">
+            <a:solidFill>
+              <a:schemeClr val="tx1">
+                <a:lumMod val="75000"/>
+                <a:lumOff val="25000"/>
+              </a:schemeClr>
+            </a:solidFill>
+            <a:tailEnd type="triangle"/>
+          </a:ln>
+        </p:spPr>
+        <p:style>
+          <a:lnRef idx="1">
+            <a:schemeClr val="accent1"/>
+          </a:lnRef>
+          <a:fillRef idx="0">
+            <a:schemeClr val="accent1"/>
+          </a:fillRef>
+          <a:effectRef idx="0">
+            <a:schemeClr val="accent1"/>
+          </a:effectRef>
+          <a:fontRef idx="minor">
+            <a:schemeClr val="tx1"/>
+          </a:fontRef>
+        </p:style>
+      </p:cxnSp>
+      <p:sp>
+        <p:nvSpPr>
+          <p:cNvPr id="10" name="TextBox 9">
+            <a:extLst>
+              <a:ext uri="{FF2B5EF4-FFF2-40B4-BE49-F238E27FC236}">
+                <a16:creationId xmlns:a16="http://schemas.microsoft.com/office/drawing/2014/main" id="{286E6784-4D4B-3AAC-ABC5-B4952A405268}"/>
+              </a:ext>
+            </a:extLst>
+          </p:cNvPr>
+          <p:cNvSpPr txBox="1"/>
+          <p:nvPr/>
+        </p:nvSpPr>
+        <p:spPr>
+          <a:xfrm>
+            <a:off x="3319415" y="4037526"/>
+            <a:ext cx="1296364" cy="523220"/>
+          </a:xfrm>
+          <a:prstGeom prst="rect">
+            <a:avLst/>
+          </a:prstGeom>
+          <a:noFill/>
+        </p:spPr>
+        <p:txBody>
+          <a:bodyPr wrap="square" rtlCol="0">
+            <a:spAutoFit/>
+          </a:bodyPr>
+          <a:lstStyle/>
+          <a:p>
+            <a:pPr algn="ctr"/>
+            <a:r>
+              <a:rPr lang="en-CA" sz="1400" dirty="0">
+                <a:latin typeface="Helvetica Neue Light" panose="02000403000000020004" pitchFamily="2" charset="0"/>
+                <a:ea typeface="Helvetica Neue Light" panose="02000403000000020004" pitchFamily="2" charset="0"/>
+              </a:rPr>
+              <a:t>2. provide the data frame</a:t>
+            </a:r>
+          </a:p>
+        </p:txBody>
+      </p:sp>
+      <p:cxnSp>
+        <p:nvCxnSpPr>
+          <p:cNvPr id="11" name="Straight Arrow Connector 10">
+            <a:extLst>
+              <a:ext uri="{FF2B5EF4-FFF2-40B4-BE49-F238E27FC236}">
+                <a16:creationId xmlns:a16="http://schemas.microsoft.com/office/drawing/2014/main" id="{C9B305D6-7BB9-B865-5AD0-788B059E2EAE}"/>
+              </a:ext>
+            </a:extLst>
+          </p:cNvPr>
+          <p:cNvCxnSpPr>
+            <a:cxnSpLocks/>
+          </p:cNvCxnSpPr>
+          <p:nvPr/>
+        </p:nvCxnSpPr>
+        <p:spPr>
+          <a:xfrm flipV="1">
+            <a:off x="3967597" y="3569983"/>
+            <a:ext cx="0" cy="354594"/>
+          </a:xfrm>
+          <a:prstGeom prst="straightConnector1">
+            <a:avLst/>
+          </a:prstGeom>
+          <a:ln w="31750">
+            <a:solidFill>
+              <a:schemeClr val="tx1">
+                <a:lumMod val="75000"/>
+                <a:lumOff val="25000"/>
+              </a:schemeClr>
+            </a:solidFill>
+            <a:tailEnd type="triangle"/>
+          </a:ln>
+        </p:spPr>
+        <p:style>
+          <a:lnRef idx="1">
+            <a:schemeClr val="accent1"/>
+          </a:lnRef>
+          <a:fillRef idx="0">
+            <a:schemeClr val="accent1"/>
+          </a:fillRef>
+          <a:effectRef idx="0">
+            <a:schemeClr val="accent1"/>
+          </a:effectRef>
+          <a:fontRef idx="minor">
+            <a:schemeClr val="tx1"/>
+          </a:fontRef>
+        </p:style>
+      </p:cxnSp>
+      <p:sp>
+        <p:nvSpPr>
+          <p:cNvPr id="13" name="TextBox 12">
+            <a:extLst>
+              <a:ext uri="{FF2B5EF4-FFF2-40B4-BE49-F238E27FC236}">
+                <a16:creationId xmlns:a16="http://schemas.microsoft.com/office/drawing/2014/main" id="{21A1DA61-1DBB-701E-D2A9-74C12C89C9BE}"/>
+              </a:ext>
+            </a:extLst>
+          </p:cNvPr>
+          <p:cNvSpPr txBox="1"/>
+          <p:nvPr/>
+        </p:nvSpPr>
+        <p:spPr>
+          <a:xfrm>
+            <a:off x="4537135" y="3960055"/>
+            <a:ext cx="1296364" cy="954107"/>
+          </a:xfrm>
+          <a:prstGeom prst="rect">
+            <a:avLst/>
+          </a:prstGeom>
+          <a:noFill/>
+        </p:spPr>
+        <p:txBody>
+          <a:bodyPr wrap="square" rtlCol="0">
+            <a:spAutoFit/>
+          </a:bodyPr>
+          <a:lstStyle/>
+          <a:p>
+            <a:pPr algn="ctr"/>
+            <a:r>
+              <a:rPr lang="en-CA" sz="1400" dirty="0">
+                <a:latin typeface="Helvetica Neue Light" panose="02000403000000020004" pitchFamily="2" charset="0"/>
+                <a:ea typeface="Helvetica Neue Light" panose="02000403000000020004" pitchFamily="2" charset="0"/>
+              </a:rPr>
+              <a:t>3. specify the type of plot we want, a bar plot</a:t>
+            </a:r>
+          </a:p>
+        </p:txBody>
+      </p:sp>
+      <p:cxnSp>
+        <p:nvCxnSpPr>
+          <p:cNvPr id="14" name="Straight Arrow Connector 13">
+            <a:extLst>
+              <a:ext uri="{FF2B5EF4-FFF2-40B4-BE49-F238E27FC236}">
+                <a16:creationId xmlns:a16="http://schemas.microsoft.com/office/drawing/2014/main" id="{29FB4DF8-0262-0A8F-33D3-2C4F9FDEC231}"/>
+              </a:ext>
+            </a:extLst>
+          </p:cNvPr>
+          <p:cNvCxnSpPr>
+            <a:cxnSpLocks/>
+          </p:cNvCxnSpPr>
+          <p:nvPr/>
+        </p:nvCxnSpPr>
+        <p:spPr>
+          <a:xfrm flipV="1">
+            <a:off x="5185317" y="3569983"/>
+            <a:ext cx="0" cy="354594"/>
+          </a:xfrm>
+          <a:prstGeom prst="straightConnector1">
+            <a:avLst/>
+          </a:prstGeom>
+          <a:ln w="31750">
+            <a:solidFill>
+              <a:schemeClr val="tx1">
+                <a:lumMod val="75000"/>
+                <a:lumOff val="25000"/>
+              </a:schemeClr>
+            </a:solidFill>
+            <a:tailEnd type="triangle"/>
+          </a:ln>
+        </p:spPr>
+        <p:style>
+          <a:lnRef idx="1">
+            <a:schemeClr val="accent1"/>
+          </a:lnRef>
+          <a:fillRef idx="0">
+            <a:schemeClr val="accent1"/>
+          </a:fillRef>
+          <a:effectRef idx="0">
+            <a:schemeClr val="accent1"/>
+          </a:effectRef>
+          <a:fontRef idx="minor">
+            <a:schemeClr val="tx1"/>
+          </a:fontRef>
+        </p:style>
+      </p:cxnSp>
+      <p:sp>
+        <p:nvSpPr>
+          <p:cNvPr id="15" name="Right Brace 14">
+            <a:extLst>
+              <a:ext uri="{FF2B5EF4-FFF2-40B4-BE49-F238E27FC236}">
+                <a16:creationId xmlns:a16="http://schemas.microsoft.com/office/drawing/2014/main" id="{FF1F71F6-7A6D-F86B-8641-3F796C538029}"/>
+              </a:ext>
+            </a:extLst>
+          </p:cNvPr>
+          <p:cNvSpPr/>
+          <p:nvPr/>
+        </p:nvSpPr>
+        <p:spPr>
+          <a:xfrm rot="16200000">
+            <a:off x="7225899" y="1340084"/>
+            <a:ext cx="381227" cy="3557448"/>
+          </a:xfrm>
+          <a:prstGeom prst="rightBrace">
+            <a:avLst>
+              <a:gd name="adj1" fmla="val 96167"/>
+              <a:gd name="adj2" fmla="val 50000"/>
+            </a:avLst>
+          </a:prstGeom>
+          <a:ln w="28575">
+            <a:solidFill>
+              <a:schemeClr val="tx1">
+                <a:lumMod val="75000"/>
+                <a:lumOff val="25000"/>
+              </a:schemeClr>
+            </a:solidFill>
+          </a:ln>
+        </p:spPr>
+        <p:style>
+          <a:lnRef idx="1">
+            <a:schemeClr val="accent1"/>
+          </a:lnRef>
+          <a:fillRef idx="0">
+            <a:schemeClr val="accent1"/>
+          </a:fillRef>
+          <a:effectRef idx="0">
+            <a:schemeClr val="accent1"/>
+          </a:effectRef>
+          <a:fontRef idx="minor">
+            <a:schemeClr val="tx1"/>
+          </a:fontRef>
+        </p:style>
+        <p:txBody>
+          <a:bodyPr rtlCol="0" anchor="ctr"/>
+          <a:lstStyle/>
+          <a:p>
+            <a:pPr algn="ctr"/>
+            <a:endParaRPr lang="en-CA"/>
+          </a:p>
+        </p:txBody>
+      </p:sp>
+      <p:sp>
+        <p:nvSpPr>
+          <p:cNvPr id="16" name="TextBox 15">
+            <a:extLst>
+              <a:ext uri="{FF2B5EF4-FFF2-40B4-BE49-F238E27FC236}">
+                <a16:creationId xmlns:a16="http://schemas.microsoft.com/office/drawing/2014/main" id="{4B0588BD-9F82-01A1-B682-9DDFF483EC6B}"/>
+              </a:ext>
+            </a:extLst>
+          </p:cNvPr>
+          <p:cNvSpPr txBox="1"/>
+          <p:nvPr/>
+        </p:nvSpPr>
+        <p:spPr>
+          <a:xfrm>
+            <a:off x="5898317" y="2159791"/>
+            <a:ext cx="3050369" cy="738664"/>
+          </a:xfrm>
+          <a:prstGeom prst="rect">
+            <a:avLst/>
+          </a:prstGeom>
+          <a:noFill/>
+        </p:spPr>
+        <p:txBody>
+          <a:bodyPr wrap="square" rtlCol="0">
+            <a:spAutoFit/>
+          </a:bodyPr>
+          <a:lstStyle/>
+          <a:p>
+            <a:pPr algn="ctr"/>
+            <a:r>
+              <a:rPr lang="en-CA" sz="1400" dirty="0">
+                <a:latin typeface="Helvetica Neue Light" panose="02000403000000020004" pitchFamily="2" charset="0"/>
+                <a:ea typeface="Helvetica Neue Light" panose="02000403000000020004" pitchFamily="2" charset="0"/>
+              </a:rPr>
+              <a:t>4. call the </a:t>
+            </a:r>
+            <a:r>
+              <a:rPr lang="en-CA" sz="1400" dirty="0">
+                <a:latin typeface="Courier New" panose="02070309020205020404" pitchFamily="49" charset="0"/>
+                <a:ea typeface="Helvetica Neue Light" panose="02000403000000020004" pitchFamily="2" charset="0"/>
+                <a:cs typeface="Courier New" panose="02070309020205020404" pitchFamily="49" charset="0"/>
+              </a:rPr>
+              <a:t>encode</a:t>
+            </a:r>
+            <a:r>
+              <a:rPr lang="en-CA" sz="1400" dirty="0">
+                <a:latin typeface="Helvetica Neue Light" panose="02000403000000020004" pitchFamily="2" charset="0"/>
+                <a:ea typeface="Helvetica Neue Light" panose="02000403000000020004" pitchFamily="2" charset="0"/>
+              </a:rPr>
+              <a:t> function to specify which columns correspond to the x and y axes</a:t>
+            </a:r>
+          </a:p>
+        </p:txBody>
+      </p:sp>
+    </p:spTree>
+    <p:extLst>
+      <p:ext uri="{BB962C8B-B14F-4D97-AF65-F5344CB8AC3E}">
+        <p14:creationId xmlns:p14="http://schemas.microsoft.com/office/powerpoint/2010/main" val="307428505"/>
+      </p:ext>
+    </p:extLst>
+  </p:cSld>
+  <p:clrMapOvr>
+    <a:masterClrMapping/>
+  </p:clrMapOvr>
+</p:sld>
+</file>
+
+<file path=ppt/slides/slide7.xml><?xml version="1.0" encoding="utf-8"?>
+<p:sld xmlns:a="http://schemas.openxmlformats.org/drawingml/2006/main" xmlns:r="http://schemas.openxmlformats.org/officeDocument/2006/relationships" xmlns:p="http://schemas.openxmlformats.org/presentationml/2006/main">
+  <p:cSld>
+    <p:spTree>
+      <p:nvGrpSpPr>
+        <p:cNvPr id="1" name=""/>
+        <p:cNvGrpSpPr/>
+        <p:nvPr/>
+      </p:nvGrpSpPr>
+      <p:grpSpPr>
+        <a:xfrm>
+          <a:off x="0" y="0"/>
+          <a:ext cx="0" cy="0"/>
+          <a:chOff x="0" y="0"/>
+          <a:chExt cx="0" cy="0"/>
+        </a:xfrm>
+      </p:grpSpPr>
+      <p:pic>
+        <p:nvPicPr>
+          <p:cNvPr id="5" name="Picture 4">
+            <a:extLst>
+              <a:ext uri="{FF2B5EF4-FFF2-40B4-BE49-F238E27FC236}">
+                <a16:creationId xmlns:a16="http://schemas.microsoft.com/office/drawing/2014/main" id="{6009445E-2D05-BBD3-ABBE-5E0464244877}"/>
+              </a:ext>
+            </a:extLst>
+          </p:cNvPr>
+          <p:cNvPicPr>
+            <a:picLocks noChangeAspect="1"/>
+          </p:cNvPicPr>
+          <p:nvPr/>
+        </p:nvPicPr>
+        <p:blipFill rotWithShape="1">
+          <a:blip r:embed="rId2"/>
+          <a:srcRect b="21730"/>
+          <a:stretch/>
+        </p:blipFill>
+        <p:spPr>
+          <a:xfrm>
+            <a:off x="3803060" y="2754114"/>
+            <a:ext cx="4585880" cy="927038"/>
+          </a:xfrm>
+          <a:prstGeom prst="rect">
+            <a:avLst/>
+          </a:prstGeom>
+        </p:spPr>
+      </p:pic>
+      <p:sp>
+        <p:nvSpPr>
+          <p:cNvPr id="6" name="TextBox 5">
+            <a:extLst>
+              <a:ext uri="{FF2B5EF4-FFF2-40B4-BE49-F238E27FC236}">
+                <a16:creationId xmlns:a16="http://schemas.microsoft.com/office/drawing/2014/main" id="{216B2F00-8B18-87A2-374E-E7565BCF2644}"/>
+              </a:ext>
+            </a:extLst>
+          </p:cNvPr>
+          <p:cNvSpPr txBox="1"/>
+          <p:nvPr/>
+        </p:nvSpPr>
+        <p:spPr>
+          <a:xfrm>
+            <a:off x="4347099" y="2003354"/>
+            <a:ext cx="1748901" cy="523220"/>
+          </a:xfrm>
+          <a:prstGeom prst="rect">
+            <a:avLst/>
+          </a:prstGeom>
+          <a:noFill/>
+        </p:spPr>
+        <p:txBody>
+          <a:bodyPr wrap="square" rtlCol="0">
+            <a:spAutoFit/>
+          </a:bodyPr>
+          <a:lstStyle/>
+          <a:p>
+            <a:pPr algn="ctr"/>
+            <a:r>
+              <a:rPr lang="en-CA" sz="1400" dirty="0">
+                <a:latin typeface="Helvetica Neue Light" panose="02000403000000020004" pitchFamily="2" charset="0"/>
+                <a:ea typeface="Helvetica Neue Light" panose="02000403000000020004" pitchFamily="2" charset="0"/>
+              </a:rPr>
+              <a:t>1. data frame object we want to reshape</a:t>
+            </a:r>
+          </a:p>
+        </p:txBody>
+      </p:sp>
+      <p:cxnSp>
+        <p:nvCxnSpPr>
+          <p:cNvPr id="7" name="Straight Arrow Connector 6">
+            <a:extLst>
+              <a:ext uri="{FF2B5EF4-FFF2-40B4-BE49-F238E27FC236}">
+                <a16:creationId xmlns:a16="http://schemas.microsoft.com/office/drawing/2014/main" id="{AF5B6DA7-64B4-6B86-A0FB-0EF80240B117}"/>
+              </a:ext>
+            </a:extLst>
+          </p:cNvPr>
+          <p:cNvCxnSpPr>
+            <a:cxnSpLocks/>
+          </p:cNvCxnSpPr>
+          <p:nvPr/>
+        </p:nvCxnSpPr>
+        <p:spPr>
+          <a:xfrm>
+            <a:off x="5672831" y="2526574"/>
+            <a:ext cx="0" cy="296525"/>
+          </a:xfrm>
+          <a:prstGeom prst="straightConnector1">
+            <a:avLst/>
+          </a:prstGeom>
+          <a:ln w="31750">
+            <a:solidFill>
+              <a:schemeClr val="tx1">
+                <a:lumMod val="75000"/>
+                <a:lumOff val="25000"/>
+              </a:schemeClr>
+            </a:solidFill>
+            <a:tailEnd type="triangle"/>
+          </a:ln>
+        </p:spPr>
+        <p:style>
+          <a:lnRef idx="1">
+            <a:schemeClr val="accent1"/>
+          </a:lnRef>
+          <a:fillRef idx="0">
+            <a:schemeClr val="accent1"/>
+          </a:fillRef>
+          <a:effectRef idx="0">
+            <a:schemeClr val="accent1"/>
+          </a:effectRef>
+          <a:fontRef idx="minor">
+            <a:schemeClr val="tx1"/>
+          </a:fontRef>
+        </p:style>
+      </p:cxnSp>
+      <p:sp>
+        <p:nvSpPr>
+          <p:cNvPr id="12" name="TextBox 11">
+            <a:extLst>
+              <a:ext uri="{FF2B5EF4-FFF2-40B4-BE49-F238E27FC236}">
+                <a16:creationId xmlns:a16="http://schemas.microsoft.com/office/drawing/2014/main" id="{17C23013-C728-FB1E-FDAD-42E6D649669F}"/>
+              </a:ext>
+            </a:extLst>
+          </p:cNvPr>
+          <p:cNvSpPr txBox="1"/>
+          <p:nvPr/>
+        </p:nvSpPr>
+        <p:spPr>
+          <a:xfrm>
+            <a:off x="7244200" y="2230894"/>
+            <a:ext cx="2000416" cy="523220"/>
+          </a:xfrm>
+          <a:prstGeom prst="rect">
+            <a:avLst/>
+          </a:prstGeom>
+          <a:noFill/>
+        </p:spPr>
+        <p:txBody>
+          <a:bodyPr wrap="square" rtlCol="0">
+            <a:spAutoFit/>
+          </a:bodyPr>
+          <a:lstStyle/>
+          <a:p>
+            <a:pPr algn="ctr"/>
+            <a:r>
+              <a:rPr lang="en-CA" sz="1400" dirty="0">
+                <a:latin typeface="Helvetica Neue Light" panose="02000403000000020004" pitchFamily="2" charset="0"/>
+                <a:ea typeface="Helvetica Neue Light" panose="02000403000000020004" pitchFamily="2" charset="0"/>
+              </a:rPr>
+              <a:t>2. columns to be used as identifier variables</a:t>
+            </a:r>
+          </a:p>
+        </p:txBody>
+      </p:sp>
+      <p:cxnSp>
+        <p:nvCxnSpPr>
+          <p:cNvPr id="13" name="Straight Arrow Connector 12">
+            <a:extLst>
+              <a:ext uri="{FF2B5EF4-FFF2-40B4-BE49-F238E27FC236}">
+                <a16:creationId xmlns:a16="http://schemas.microsoft.com/office/drawing/2014/main" id="{5E461E9F-F0B1-3027-B443-955CF3672AFE}"/>
+              </a:ext>
+            </a:extLst>
+          </p:cNvPr>
+          <p:cNvCxnSpPr>
+            <a:cxnSpLocks/>
+          </p:cNvCxnSpPr>
+          <p:nvPr/>
+        </p:nvCxnSpPr>
+        <p:spPr>
+          <a:xfrm flipH="1">
+            <a:off x="6831138" y="2592280"/>
+            <a:ext cx="519573" cy="389374"/>
+          </a:xfrm>
+          <a:prstGeom prst="straightConnector1">
+            <a:avLst/>
+          </a:prstGeom>
+          <a:ln w="31750">
+            <a:solidFill>
+              <a:schemeClr val="tx1">
+                <a:lumMod val="75000"/>
+                <a:lumOff val="25000"/>
+              </a:schemeClr>
+            </a:solidFill>
+            <a:tailEnd type="triangle"/>
+          </a:ln>
+        </p:spPr>
+        <p:style>
+          <a:lnRef idx="1">
+            <a:schemeClr val="accent1"/>
+          </a:lnRef>
+          <a:fillRef idx="0">
+            <a:schemeClr val="accent1"/>
+          </a:fillRef>
+          <a:effectRef idx="0">
+            <a:schemeClr val="accent1"/>
+          </a:effectRef>
+          <a:fontRef idx="minor">
+            <a:schemeClr val="tx1"/>
+          </a:fontRef>
+        </p:style>
+      </p:cxnSp>
+      <p:sp>
+        <p:nvSpPr>
+          <p:cNvPr id="16" name="TextBox 15">
+            <a:extLst>
+              <a:ext uri="{FF2B5EF4-FFF2-40B4-BE49-F238E27FC236}">
+                <a16:creationId xmlns:a16="http://schemas.microsoft.com/office/drawing/2014/main" id="{73DEE7D0-B0B4-6E01-ECE9-D6CB1DBEAEBF}"/>
+              </a:ext>
+            </a:extLst>
+          </p:cNvPr>
+          <p:cNvSpPr txBox="1"/>
+          <p:nvPr/>
+        </p:nvSpPr>
+        <p:spPr>
+          <a:xfrm>
+            <a:off x="6960894" y="2969637"/>
+            <a:ext cx="2000416" cy="523220"/>
+          </a:xfrm>
+          <a:prstGeom prst="rect">
+            <a:avLst/>
+          </a:prstGeom>
+          <a:noFill/>
+        </p:spPr>
+        <p:txBody>
+          <a:bodyPr wrap="square" rtlCol="0">
+            <a:spAutoFit/>
+          </a:bodyPr>
+          <a:lstStyle/>
+          <a:p>
+            <a:pPr algn="ctr"/>
+            <a:r>
+              <a:rPr lang="en-CA" sz="1400" dirty="0">
+                <a:latin typeface="Helvetica Neue Light" panose="02000403000000020004" pitchFamily="2" charset="0"/>
+                <a:ea typeface="Helvetica Neue Light" panose="02000403000000020004" pitchFamily="2" charset="0"/>
+              </a:rPr>
+              <a:t>3. name of the new column to be created</a:t>
+            </a:r>
+          </a:p>
+        </p:txBody>
+      </p:sp>
+      <p:cxnSp>
+        <p:nvCxnSpPr>
+          <p:cNvPr id="17" name="Straight Arrow Connector 16">
+            <a:extLst>
+              <a:ext uri="{FF2B5EF4-FFF2-40B4-BE49-F238E27FC236}">
+                <a16:creationId xmlns:a16="http://schemas.microsoft.com/office/drawing/2014/main" id="{046A4BBB-A2E2-E811-5572-7E12E1B4DE6E}"/>
+              </a:ext>
+            </a:extLst>
+          </p:cNvPr>
+          <p:cNvCxnSpPr>
+            <a:cxnSpLocks/>
+          </p:cNvCxnSpPr>
+          <p:nvPr/>
+        </p:nvCxnSpPr>
+        <p:spPr>
+          <a:xfrm flipH="1">
+            <a:off x="5964075" y="3250134"/>
+            <a:ext cx="1186888" cy="29432"/>
+          </a:xfrm>
+          <a:prstGeom prst="straightConnector1">
+            <a:avLst/>
+          </a:prstGeom>
+          <a:ln w="31750">
+            <a:solidFill>
+              <a:schemeClr val="tx1">
+                <a:lumMod val="75000"/>
+                <a:lumOff val="25000"/>
+              </a:schemeClr>
+            </a:solidFill>
+            <a:tailEnd type="triangle"/>
+          </a:ln>
+        </p:spPr>
+        <p:style>
+          <a:lnRef idx="1">
+            <a:schemeClr val="accent1"/>
+          </a:lnRef>
+          <a:fillRef idx="0">
+            <a:schemeClr val="accent1"/>
+          </a:fillRef>
+          <a:effectRef idx="0">
+            <a:schemeClr val="accent1"/>
+          </a:effectRef>
+          <a:fontRef idx="minor">
+            <a:schemeClr val="tx1"/>
+          </a:fontRef>
+        </p:style>
+      </p:cxnSp>
+      <p:sp>
+        <p:nvSpPr>
+          <p:cNvPr id="23" name="TextBox 22">
+            <a:extLst>
+              <a:ext uri="{FF2B5EF4-FFF2-40B4-BE49-F238E27FC236}">
+                <a16:creationId xmlns:a16="http://schemas.microsoft.com/office/drawing/2014/main" id="{160E65F8-DCB4-0A1A-DD53-0BA547305C73}"/>
+              </a:ext>
+            </a:extLst>
+          </p:cNvPr>
+          <p:cNvSpPr txBox="1"/>
+          <p:nvPr/>
+        </p:nvSpPr>
+        <p:spPr>
+          <a:xfrm>
+            <a:off x="6199906" y="3761337"/>
+            <a:ext cx="2088587" cy="523220"/>
+          </a:xfrm>
+          <a:prstGeom prst="rect">
+            <a:avLst/>
+          </a:prstGeom>
+          <a:noFill/>
+        </p:spPr>
+        <p:txBody>
+          <a:bodyPr wrap="square" rtlCol="0">
+            <a:spAutoFit/>
+          </a:bodyPr>
+          <a:lstStyle/>
+          <a:p>
+            <a:pPr algn="ctr"/>
+            <a:r>
+              <a:rPr lang="en-CA" sz="1400" dirty="0">
+                <a:latin typeface="Helvetica Neue Light" panose="02000403000000020004" pitchFamily="2" charset="0"/>
+                <a:ea typeface="Helvetica Neue Light" panose="02000403000000020004" pitchFamily="2" charset="0"/>
+              </a:rPr>
+              <a:t>4. values of the columns we want to combine </a:t>
+            </a:r>
+          </a:p>
+        </p:txBody>
+      </p:sp>
+      <p:cxnSp>
+        <p:nvCxnSpPr>
+          <p:cNvPr id="24" name="Straight Arrow Connector 23">
+            <a:extLst>
+              <a:ext uri="{FF2B5EF4-FFF2-40B4-BE49-F238E27FC236}">
+                <a16:creationId xmlns:a16="http://schemas.microsoft.com/office/drawing/2014/main" id="{AD4997BE-32CB-CCD2-5B4A-7C29BF7CB6DB}"/>
+              </a:ext>
+            </a:extLst>
+          </p:cNvPr>
+          <p:cNvCxnSpPr>
+            <a:cxnSpLocks/>
+            <a:stCxn id="23" idx="1"/>
+          </p:cNvCxnSpPr>
+          <p:nvPr/>
+        </p:nvCxnSpPr>
+        <p:spPr>
+          <a:xfrm flipH="1" flipV="1">
+            <a:off x="5672831" y="3591786"/>
+            <a:ext cx="527075" cy="431161"/>
+          </a:xfrm>
+          <a:prstGeom prst="straightConnector1">
+            <a:avLst/>
+          </a:prstGeom>
+          <a:ln w="31750">
+            <a:solidFill>
+              <a:schemeClr val="tx1">
+                <a:lumMod val="75000"/>
+                <a:lumOff val="25000"/>
+              </a:schemeClr>
+            </a:solidFill>
+            <a:tailEnd type="triangle"/>
+          </a:ln>
+        </p:spPr>
+        <p:style>
+          <a:lnRef idx="1">
+            <a:schemeClr val="accent1"/>
+          </a:lnRef>
+          <a:fillRef idx="0">
+            <a:schemeClr val="accent1"/>
+          </a:fillRef>
+          <a:effectRef idx="0">
+            <a:schemeClr val="accent1"/>
+          </a:effectRef>
+          <a:fontRef idx="minor">
+            <a:schemeClr val="tx1"/>
+          </a:fontRef>
+        </p:style>
+      </p:cxnSp>
+    </p:spTree>
+    <p:extLst>
+      <p:ext uri="{BB962C8B-B14F-4D97-AF65-F5344CB8AC3E}">
+        <p14:creationId xmlns:p14="http://schemas.microsoft.com/office/powerpoint/2010/main" val="3599765728"/>
       </p:ext>
     </p:extLst>
   </p:cSld>

</xml_diff>